<commit_message>
Update Exploring climate data’s relevance to predict energy consumption.pptx
</commit_message>
<xml_diff>
--- a/Exploring climate data’s relevance to predict energy consumption.pptx
+++ b/Exploring climate data’s relevance to predict energy consumption.pptx
@@ -144,6 +144,22 @@
 
 <file path=ppt/changesInfos/changesInfo1.xml><?xml version="1.0" encoding="utf-8"?>
 <pc:chgInfo xmlns:a="http://schemas.openxmlformats.org/drawingml/2006/main" xmlns:r="http://schemas.openxmlformats.org/officeDocument/2006/relationships" xmlns:ac="http://schemas.microsoft.com/office/drawing/2013/main/command" xmlns:pc="http://schemas.microsoft.com/office/powerpoint/2013/main/command">
+  <pc:docChgLst>
+    <pc:chgData name="Mathias Østergaard Hansen" userId="b7fcfced-beb2-45ad-a9ff-678f6b94dd21" providerId="ADAL" clId="{3CAEE8DF-CD62-4FF0-8235-A58B5840A0C5}"/>
+    <pc:docChg chg="custSel modSld">
+      <pc:chgData name="Mathias Østergaard Hansen" userId="b7fcfced-beb2-45ad-a9ff-678f6b94dd21" providerId="ADAL" clId="{3CAEE8DF-CD62-4FF0-8235-A58B5840A0C5}" dt="2022-06-16T11:29:03.806" v="165" actId="20577"/>
+      <pc:docMkLst>
+        <pc:docMk/>
+      </pc:docMkLst>
+      <pc:sldChg chg="modNotesTx">
+        <pc:chgData name="Mathias Østergaard Hansen" userId="b7fcfced-beb2-45ad-a9ff-678f6b94dd21" providerId="ADAL" clId="{3CAEE8DF-CD62-4FF0-8235-A58B5840A0C5}" dt="2022-06-16T11:29:03.806" v="165" actId="20577"/>
+        <pc:sldMkLst>
+          <pc:docMk/>
+          <pc:sldMk cId="3625180031" sldId="275"/>
+        </pc:sldMkLst>
+      </pc:sldChg>
+    </pc:docChg>
+  </pc:docChgLst>
   <pc:docChgLst>
     <pc:chgData name="Mathias Østergaard" userId="a5d1e7bd90b8f6c9" providerId="LiveId" clId="{7F6AA87F-2719-4F4F-AE1C-C2661332DAC4}"/>
     <pc:docChg chg="undo custSel addSld delSld modSld">
@@ -4756,6 +4772,142 @@
 </p:notes>
 </file>
 
+<file path=ppt/notesSlides/notesSlide6.xml><?xml version="1.0" encoding="utf-8"?>
+<p:notes xmlns:a="http://schemas.openxmlformats.org/drawingml/2006/main" xmlns:r="http://schemas.openxmlformats.org/officeDocument/2006/relationships" xmlns:p="http://schemas.openxmlformats.org/presentationml/2006/main">
+  <p:cSld>
+    <p:spTree>
+      <p:nvGrpSpPr>
+        <p:cNvPr id="1" name=""/>
+        <p:cNvGrpSpPr/>
+        <p:nvPr/>
+      </p:nvGrpSpPr>
+      <p:grpSpPr>
+        <a:xfrm>
+          <a:off x="0" y="0"/>
+          <a:ext cx="0" cy="0"/>
+          <a:chOff x="0" y="0"/>
+          <a:chExt cx="0" cy="0"/>
+        </a:xfrm>
+      </p:grpSpPr>
+      <p:sp>
+        <p:nvSpPr>
+          <p:cNvPr id="2" name="Pladsholder til slidebillede 1"/>
+          <p:cNvSpPr>
+            <a:spLocks noGrp="1" noRot="1" noChangeAspect="1"/>
+          </p:cNvSpPr>
+          <p:nvPr>
+            <p:ph type="sldImg"/>
+          </p:nvPr>
+        </p:nvSpPr>
+        <p:spPr/>
+      </p:sp>
+      <p:sp>
+        <p:nvSpPr>
+          <p:cNvPr id="3" name="Pladsholder til noter 2"/>
+          <p:cNvSpPr>
+            <a:spLocks noGrp="1"/>
+          </p:cNvSpPr>
+          <p:nvPr>
+            <p:ph type="body" idx="1"/>
+          </p:nvPr>
+        </p:nvSpPr>
+        <p:spPr/>
+        <p:txBody>
+          <a:bodyPr/>
+          <a:lstStyle/>
+          <a:p>
+            <a:r>
+              <a:rPr lang="da-DK" dirty="0"/>
+              <a:t>Læg mere kræft på mine valg</a:t>
+            </a:r>
+          </a:p>
+          <a:p>
+            <a:r>
+              <a:rPr lang="da-DK" dirty="0"/>
+              <a:t>Valg af data</a:t>
+            </a:r>
+          </a:p>
+          <a:p>
+            <a:r>
+              <a:rPr lang="da-DK" dirty="0"/>
+              <a:t>Time til time</a:t>
+            </a:r>
+          </a:p>
+          <a:p>
+            <a:r>
+              <a:rPr lang="da-DK" dirty="0"/>
+              <a:t>Overfitting</a:t>
+            </a:r>
+          </a:p>
+          <a:p>
+            <a:r>
+              <a:rPr lang="da-DK" dirty="0"/>
+              <a:t>Agenda/emner </a:t>
+            </a:r>
+          </a:p>
+          <a:p>
+            <a:r>
+              <a:rPr lang="da-DK" dirty="0"/>
+              <a:t>Største </a:t>
+            </a:r>
+            <a:r>
+              <a:rPr lang="da-DK" dirty="0" err="1"/>
+              <a:t>take-away</a:t>
+            </a:r>
+            <a:endParaRPr lang="da-DK" dirty="0"/>
+          </a:p>
+          <a:p>
+            <a:r>
+              <a:rPr lang="da-DK" dirty="0"/>
+              <a:t>Hvis jeg startede forfra, </a:t>
+            </a:r>
+            <a:r>
+              <a:rPr lang="da-DK" dirty="0" err="1"/>
+              <a:t>havd</a:t>
+            </a:r>
+            <a:r>
+              <a:rPr lang="da-DK"/>
+              <a:t> ville jeg så?</a:t>
+            </a:r>
+          </a:p>
+        </p:txBody>
+      </p:sp>
+      <p:sp>
+        <p:nvSpPr>
+          <p:cNvPr id="4" name="Pladsholder til slidenummer 3"/>
+          <p:cNvSpPr>
+            <a:spLocks noGrp="1"/>
+          </p:cNvSpPr>
+          <p:nvPr>
+            <p:ph type="sldNum" sz="quarter" idx="5"/>
+          </p:nvPr>
+        </p:nvSpPr>
+        <p:spPr/>
+        <p:txBody>
+          <a:bodyPr/>
+          <a:lstStyle/>
+          <a:p>
+            <a:fld id="{429920BF-1F0D-4EA5-A8AF-C0C2AA4AF747}" type="slidenum">
+              <a:rPr lang="da-DK" smtClean="0"/>
+              <a:t>20</a:t>
+            </a:fld>
+            <a:endParaRPr lang="da-DK"/>
+          </a:p>
+        </p:txBody>
+      </p:sp>
+    </p:spTree>
+    <p:extLst>
+      <p:ext uri="{BB962C8B-B14F-4D97-AF65-F5344CB8AC3E}">
+        <p14:creationId xmlns:p14="http://schemas.microsoft.com/office/powerpoint/2010/main" val="2353216708"/>
+      </p:ext>
+    </p:extLst>
+  </p:cSld>
+  <p:clrMapOvr>
+    <a:masterClrMapping/>
+  </p:clrMapOvr>
+</p:notes>
+</file>
+
 <file path=ppt/slideLayouts/slideLayout1.xml><?xml version="1.0" encoding="utf-8"?>
 <p:sldLayout xmlns:a="http://schemas.openxmlformats.org/drawingml/2006/main" xmlns:r="http://schemas.openxmlformats.org/officeDocument/2006/relationships" xmlns:p="http://schemas.openxmlformats.org/presentationml/2006/main" showMasterSp="0" type="title" preserve="1">
   <p:cSld name="Titelslide">

</xml_diff>